<commit_message>
Update font size of poster and ERD
</commit_message>
<xml_diff>
--- a/docs/poster.pptx
+++ b/docs/poster.pptx
@@ -254,7 +254,7 @@
           <a:p>
             <a:fld id="{C8C68A4F-5072-4E89-BF9F-B138CC9B4D68}" type="datetimeFigureOut">
               <a:rPr lang="en-US" smtClean="0"/>
-              <a:t>6/5/2019</a:t>
+              <a:t>6/10/2019</a:t>
             </a:fld>
             <a:endParaRPr lang="en-US"/>
           </a:p>
@@ -424,7 +424,7 @@
           <a:p>
             <a:fld id="{C8C68A4F-5072-4E89-BF9F-B138CC9B4D68}" type="datetimeFigureOut">
               <a:rPr lang="en-US" smtClean="0"/>
-              <a:t>6/5/2019</a:t>
+              <a:t>6/10/2019</a:t>
             </a:fld>
             <a:endParaRPr lang="en-US"/>
           </a:p>
@@ -604,7 +604,7 @@
           <a:p>
             <a:fld id="{C8C68A4F-5072-4E89-BF9F-B138CC9B4D68}" type="datetimeFigureOut">
               <a:rPr lang="en-US" smtClean="0"/>
-              <a:t>6/5/2019</a:t>
+              <a:t>6/10/2019</a:t>
             </a:fld>
             <a:endParaRPr lang="en-US"/>
           </a:p>
@@ -774,7 +774,7 @@
           <a:p>
             <a:fld id="{C8C68A4F-5072-4E89-BF9F-B138CC9B4D68}" type="datetimeFigureOut">
               <a:rPr lang="en-US" smtClean="0"/>
-              <a:t>6/5/2019</a:t>
+              <a:t>6/10/2019</a:t>
             </a:fld>
             <a:endParaRPr lang="en-US"/>
           </a:p>
@@ -1018,7 +1018,7 @@
           <a:p>
             <a:fld id="{C8C68A4F-5072-4E89-BF9F-B138CC9B4D68}" type="datetimeFigureOut">
               <a:rPr lang="en-US" smtClean="0"/>
-              <a:t>6/5/2019</a:t>
+              <a:t>6/10/2019</a:t>
             </a:fld>
             <a:endParaRPr lang="en-US"/>
           </a:p>
@@ -1250,7 +1250,7 @@
           <a:p>
             <a:fld id="{C8C68A4F-5072-4E89-BF9F-B138CC9B4D68}" type="datetimeFigureOut">
               <a:rPr lang="en-US" smtClean="0"/>
-              <a:t>6/5/2019</a:t>
+              <a:t>6/10/2019</a:t>
             </a:fld>
             <a:endParaRPr lang="en-US"/>
           </a:p>
@@ -1617,7 +1617,7 @@
           <a:p>
             <a:fld id="{C8C68A4F-5072-4E89-BF9F-B138CC9B4D68}" type="datetimeFigureOut">
               <a:rPr lang="en-US" smtClean="0"/>
-              <a:t>6/5/2019</a:t>
+              <a:t>6/10/2019</a:t>
             </a:fld>
             <a:endParaRPr lang="en-US"/>
           </a:p>
@@ -1735,7 +1735,7 @@
           <a:p>
             <a:fld id="{C8C68A4F-5072-4E89-BF9F-B138CC9B4D68}" type="datetimeFigureOut">
               <a:rPr lang="en-US" smtClean="0"/>
-              <a:t>6/5/2019</a:t>
+              <a:t>6/10/2019</a:t>
             </a:fld>
             <a:endParaRPr lang="en-US"/>
           </a:p>
@@ -1830,7 +1830,7 @@
           <a:p>
             <a:fld id="{C8C68A4F-5072-4E89-BF9F-B138CC9B4D68}" type="datetimeFigureOut">
               <a:rPr lang="en-US" smtClean="0"/>
-              <a:t>6/5/2019</a:t>
+              <a:t>6/10/2019</a:t>
             </a:fld>
             <a:endParaRPr lang="en-US"/>
           </a:p>
@@ -2107,7 +2107,7 @@
           <a:p>
             <a:fld id="{C8C68A4F-5072-4E89-BF9F-B138CC9B4D68}" type="datetimeFigureOut">
               <a:rPr lang="en-US" smtClean="0"/>
-              <a:t>6/5/2019</a:t>
+              <a:t>6/10/2019</a:t>
             </a:fld>
             <a:endParaRPr lang="en-US"/>
           </a:p>
@@ -2364,7 +2364,7 @@
           <a:p>
             <a:fld id="{C8C68A4F-5072-4E89-BF9F-B138CC9B4D68}" type="datetimeFigureOut">
               <a:rPr lang="en-US" smtClean="0"/>
-              <a:t>6/5/2019</a:t>
+              <a:t>6/10/2019</a:t>
             </a:fld>
             <a:endParaRPr lang="en-US"/>
           </a:p>
@@ -2577,7 +2577,7 @@
           <a:p>
             <a:fld id="{C8C68A4F-5072-4E89-BF9F-B138CC9B4D68}" type="datetimeFigureOut">
               <a:rPr lang="en-US" smtClean="0"/>
-              <a:t>6/5/2019</a:t>
+              <a:t>6/10/2019</a:t>
             </a:fld>
             <a:endParaRPr lang="en-US"/>
           </a:p>
@@ -2984,10 +2984,10 @@
       </p:grpSpPr>
       <p:pic>
         <p:nvPicPr>
-          <p:cNvPr id="7" name="Picture 6" descr="A close up of a map&#10;&#10;Description automatically generated">
+          <p:cNvPr id="6" name="Picture 5" descr="A close up of text on a white background&#10;&#10;Description automatically generated">
             <a:extLst>
               <a:ext uri="{FF2B5EF4-FFF2-40B4-BE49-F238E27FC236}">
-                <a16:creationId xmlns:a16="http://schemas.microsoft.com/office/drawing/2014/main" id="{09038F82-C08F-477A-AA68-05A14BEC03E6}"/>
+                <a16:creationId xmlns:a16="http://schemas.microsoft.com/office/drawing/2014/main" id="{CF0EA7A2-F19C-4D54-BE37-57866CC0724F}"/>
               </a:ext>
             </a:extLst>
           </p:cNvPr>
@@ -3010,8 +3010,8 @@
         </p:blipFill>
         <p:spPr>
           <a:xfrm>
-            <a:off x="3327363" y="5377889"/>
-            <a:ext cx="3556498" cy="2798643"/>
+            <a:off x="3295495" y="5107911"/>
+            <a:ext cx="3510330" cy="2850416"/>
           </a:xfrm>
           <a:prstGeom prst="rect">
             <a:avLst/>
@@ -3036,8 +3036,8 @@
         </p:nvSpPr>
         <p:spPr>
           <a:xfrm>
-            <a:off x="1424763" y="1187125"/>
-            <a:ext cx="5360874" cy="1040707"/>
+            <a:off x="1247809" y="1187125"/>
+            <a:ext cx="5537828" cy="1209301"/>
           </a:xfrm>
         </p:spPr>
         <p:txBody>
@@ -3055,7 +3055,7 @@
               </a:spcBef>
             </a:pPr>
             <a:r>
-              <a:rPr lang="he-IL" sz="1000" dirty="0"/>
+              <a:rPr lang="he-IL" sz="1200" dirty="0"/>
               <a:t>בשנים האחרונות ילדים מבלים את רוב זמנם בשימוש בטכנולוגיות כגון: סמארטפונים, מחשבים, טאבלטים. תופעה זו באה על חשבון קריאת ספרים וכתוצאה מכך לילדים יש:</a:t>
             </a:r>
           </a:p>
@@ -3071,7 +3071,7 @@
               <a:buChar char="•"/>
             </a:pPr>
             <a:r>
-              <a:rPr lang="he-IL" sz="1000" dirty="0"/>
+              <a:rPr lang="he-IL" sz="1200" dirty="0"/>
               <a:t> שפה דלה שפוגעת ביכולת הביטוי העצמי בדיבור ובכתיבה.</a:t>
             </a:r>
           </a:p>
@@ -3087,7 +3087,7 @@
               <a:buChar char="•"/>
             </a:pPr>
             <a:r>
-              <a:rPr lang="he-IL" sz="1000" dirty="0"/>
+              <a:rPr lang="he-IL" sz="1200" dirty="0"/>
               <a:t>דמיון פחות מפותח.</a:t>
             </a:r>
           </a:p>
@@ -3101,7 +3101,7 @@
               </a:spcBef>
             </a:pPr>
             <a:r>
-              <a:rPr lang="he-IL" sz="1000" dirty="0"/>
+              <a:rPr lang="he-IL" sz="1200" dirty="0"/>
               <a:t>הורים ומורים נתקלים בקושי רב לעודד ילדים לקרוא ספרים.</a:t>
             </a:r>
           </a:p>
@@ -3132,7 +3132,7 @@
         </p:nvGrpSpPr>
         <p:grpSpPr>
           <a:xfrm>
-            <a:off x="502785" y="4271866"/>
+            <a:off x="266256" y="4312348"/>
             <a:ext cx="1598704" cy="1644611"/>
             <a:chOff x="624605" y="454611"/>
             <a:chExt cx="3579670" cy="3750799"/>
@@ -3697,8 +3697,8 @@
         </p:nvSpPr>
         <p:spPr>
           <a:xfrm>
-            <a:off x="2286010" y="4340752"/>
-            <a:ext cx="1750127" cy="1602258"/>
+            <a:off x="1925175" y="4534877"/>
+            <a:ext cx="1750127" cy="1861761"/>
           </a:xfrm>
           <a:prstGeom prst="rect">
             <a:avLst/>
@@ -3878,7 +3878,7 @@
               <a:buChar char="•"/>
             </a:pPr>
             <a:r>
-              <a:rPr lang="he-IL" sz="1000" dirty="0"/>
+              <a:rPr lang="he-IL" sz="1200" dirty="0"/>
               <a:t>ניהול קריאת ספרים.</a:t>
             </a:r>
           </a:p>
@@ -3888,7 +3888,7 @@
               <a:buChar char="•"/>
             </a:pPr>
             <a:r>
-              <a:rPr lang="he-IL" sz="1000" dirty="0"/>
+              <a:rPr lang="he-IL" sz="1200" dirty="0"/>
               <a:t> ניהול בחנים.</a:t>
             </a:r>
           </a:p>
@@ -3898,7 +3898,7 @@
               <a:buChar char="•"/>
             </a:pPr>
             <a:r>
-              <a:rPr lang="he-IL" sz="1000" dirty="0"/>
+              <a:rPr lang="he-IL" sz="1200" dirty="0"/>
               <a:t>ניהול נקודות.</a:t>
             </a:r>
           </a:p>
@@ -3908,7 +3908,7 @@
               <a:buChar char="•"/>
             </a:pPr>
             <a:r>
-              <a:rPr lang="he-IL" sz="1000" dirty="0"/>
+              <a:rPr lang="he-IL" sz="1200" dirty="0"/>
               <a:t>ניהול קניית משחקים.</a:t>
             </a:r>
           </a:p>
@@ -3918,7 +3918,7 @@
               <a:buChar char="•"/>
             </a:pPr>
             <a:r>
-              <a:rPr lang="he-IL" sz="1000" dirty="0"/>
+              <a:rPr lang="he-IL" sz="1200" dirty="0"/>
               <a:t>ניהול רשמים על ספרים והעלאת ציורים.</a:t>
             </a:r>
           </a:p>
@@ -3928,7 +3928,7 @@
               <a:buChar char="•"/>
             </a:pPr>
             <a:r>
-              <a:rPr lang="he-IL" sz="1000" dirty="0"/>
+              <a:rPr lang="he-IL" sz="1200" dirty="0"/>
               <a:t>ניהול מאגר ספרים.</a:t>
             </a:r>
           </a:p>
@@ -3969,8 +3969,8 @@
         </p:blipFill>
         <p:spPr>
           <a:xfrm>
-            <a:off x="5139326" y="2873592"/>
-            <a:ext cx="1575699" cy="1110867"/>
+            <a:off x="5335650" y="2790091"/>
+            <a:ext cx="1439310" cy="1014713"/>
           </a:xfrm>
           <a:prstGeom prst="rect">
             <a:avLst/>
@@ -4471,7 +4471,7 @@
         </p:nvSpPr>
         <p:spPr>
           <a:xfrm>
-            <a:off x="3585748" y="2789808"/>
+            <a:off x="3940187" y="2774059"/>
             <a:ext cx="1256339" cy="265362"/>
           </a:xfrm>
           <a:prstGeom prst="roundRect">
@@ -4537,7 +4537,7 @@
         </p:nvSpPr>
         <p:spPr>
           <a:xfrm>
-            <a:off x="1925175" y="4009873"/>
+            <a:off x="1777808" y="4133382"/>
             <a:ext cx="1892953" cy="286359"/>
           </a:xfrm>
           <a:prstGeom prst="roundRect">
@@ -5246,8 +5246,8 @@
         </p:nvSpPr>
         <p:spPr>
           <a:xfrm>
-            <a:off x="-189592" y="3115696"/>
-            <a:ext cx="5274819" cy="664354"/>
+            <a:off x="38469" y="3102606"/>
+            <a:ext cx="5246994" cy="1080769"/>
           </a:xfrm>
           <a:prstGeom prst="rect">
             <a:avLst/>
@@ -5430,23 +5430,23 @@
               <a:buChar char="•"/>
             </a:pPr>
             <a:r>
-              <a:rPr lang="he-IL" sz="1000" dirty="0"/>
+              <a:rPr lang="he-IL" sz="1200" dirty="0"/>
               <a:t>מערכת מבוססת </a:t>
             </a:r>
             <a:r>
-              <a:rPr lang="en-US" sz="1000" dirty="0"/>
+              <a:rPr lang="en-US" sz="1200" dirty="0"/>
               <a:t>Web </a:t>
             </a:r>
             <a:r>
-              <a:rPr lang="he-IL" sz="1000" dirty="0"/>
+              <a:rPr lang="he-IL" sz="1200" dirty="0"/>
               <a:t> אשר מעודדת את הילדים לקרוא ספרים באמצעות פרסים ומשחקי </a:t>
             </a:r>
             <a:r>
-              <a:rPr lang="en-US" sz="1000" dirty="0"/>
+              <a:rPr lang="en-US" sz="1200" dirty="0"/>
               <a:t>Web</a:t>
             </a:r>
             <a:r>
-              <a:rPr lang="he-IL" sz="1000" dirty="0"/>
+              <a:rPr lang="he-IL" sz="1200" dirty="0"/>
               <a:t>.</a:t>
             </a:r>
           </a:p>
@@ -5459,7 +5459,7 @@
               <a:buChar char="•"/>
             </a:pPr>
             <a:r>
-              <a:rPr lang="he-IL" sz="1000" dirty="0"/>
+              <a:rPr lang="he-IL" sz="1200" dirty="0"/>
               <a:t>יצירת פלטפורמה להורים ומורים למעקב אחר התקדמות הילדים בקריאת ספרים.</a:t>
             </a:r>
           </a:p>
@@ -5472,10 +5472,10 @@
               <a:buChar char="•"/>
             </a:pPr>
             <a:r>
-              <a:rPr lang="he-IL" sz="1000" dirty="0"/>
+              <a:rPr lang="he-IL" sz="1200" dirty="0"/>
               <a:t>קהל היעד הם הקהל הרחב של הילדים במסגרת בית ספר או בשימוש עצמי בעידוד ההורים.</a:t>
             </a:r>
-            <a:endParaRPr lang="en-US" sz="1000" dirty="0"/>
+            <a:endParaRPr lang="en-US" sz="1200" dirty="0"/>
           </a:p>
           <a:p>
             <a:pPr algn="r" rtl="1">
@@ -5504,7 +5504,7 @@
         </p:nvSpPr>
         <p:spPr>
           <a:xfrm>
-            <a:off x="4583901" y="4986116"/>
+            <a:off x="4791402" y="4637670"/>
             <a:ext cx="1461198" cy="239223"/>
           </a:xfrm>
           <a:prstGeom prst="roundRect">
@@ -5570,7 +5570,7 @@
         </p:nvGrpSpPr>
         <p:grpSpPr>
           <a:xfrm>
-            <a:off x="158769" y="6526416"/>
+            <a:off x="86154" y="6552326"/>
             <a:ext cx="2567246" cy="1897573"/>
             <a:chOff x="237314" y="2438268"/>
             <a:chExt cx="3384938" cy="2519225"/>

</xml_diff>

<commit_message>
update if kid has quiz in particular book
</commit_message>
<xml_diff>
--- a/docs/poster.pptx
+++ b/docs/poster.pptx
@@ -6193,42 +6193,6 @@
           </p:spPr>
         </p:pic>
       </p:grpSp>
-      <p:pic>
-        <p:nvPicPr>
-          <p:cNvPr id="7" name="Picture 6" descr="A close up of a logo&#10;&#10;Description automatically generated">
-            <a:extLst>
-              <a:ext uri="{FF2B5EF4-FFF2-40B4-BE49-F238E27FC236}">
-                <a16:creationId xmlns:a16="http://schemas.microsoft.com/office/drawing/2014/main" id="{54C8ED96-D816-40BF-9C93-4AEDBCA1BA47}"/>
-              </a:ext>
-            </a:extLst>
-          </p:cNvPr>
-          <p:cNvPicPr>
-            <a:picLocks noChangeAspect="1"/>
-          </p:cNvPicPr>
-          <p:nvPr/>
-        </p:nvPicPr>
-        <p:blipFill>
-          <a:blip r:embed="rId31">
-            <a:extLst>
-              <a:ext uri="{28A0092B-C50C-407E-A947-70E740481C1C}">
-                <a14:useLocalDpi xmlns:a14="http://schemas.microsoft.com/office/drawing/2010/main" val="0"/>
-              </a:ext>
-            </a:extLst>
-          </a:blip>
-          <a:stretch>
-            <a:fillRect/>
-          </a:stretch>
-        </p:blipFill>
-        <p:spPr>
-          <a:xfrm>
-            <a:off x="3006118" y="5452632"/>
-            <a:ext cx="3887473" cy="3057176"/>
-          </a:xfrm>
-          <a:prstGeom prst="rect">
-            <a:avLst/>
-          </a:prstGeom>
-        </p:spPr>
-      </p:pic>
     </p:spTree>
     <p:extLst>
       <p:ext uri="{BB962C8B-B14F-4D97-AF65-F5344CB8AC3E}">

</xml_diff>